<commit_message>
SEP2324G06-8 een slide toegevoegd met ons rack
</commit_message>
<xml_diff>
--- a/opdrachten/Offerte/Presentatie.pptx
+++ b/opdrachten/Offerte/Presentatie.pptx
@@ -9,6 +9,7 @@
     <p:sldId id="257" r:id="rId3"/>
     <p:sldId id="258" r:id="rId4"/>
     <p:sldId id="260" r:id="rId5"/>
+    <p:sldId id="261" r:id="rId6"/>
   </p:sldIdLst>
   <p:sldSz cx="12192000" cy="6858000"/>
   <p:notesSz cx="6858000" cy="9144000"/>
@@ -107,6 +108,11 @@
       </a:defRPr>
     </a:lvl9pPr>
   </p:defaultTextStyle>
+  <p:extLst>
+    <p:ext uri="{EFAFB233-063F-42B5-8137-9DF3F51BA10A}">
+      <p15:sldGuideLst xmlns:p15="http://schemas.microsoft.com/office/powerpoint/2012/main"/>
+    </p:ext>
+  </p:extLst>
 </p:presentation>
 </file>
 
@@ -531,7 +537,7 @@
           <a:p>
             <a:fld id="{53BEF823-48A5-43FC-BE03-E79964288B41}" type="datetimeFigureOut">
               <a:rPr lang="en-US" smtClean="0"/>
-              <a:t>3/5/2024</a:t>
+              <a:t>3/6/2024</a:t>
             </a:fld>
             <a:endParaRPr lang="en-US" dirty="0"/>
           </a:p>
@@ -742,7 +748,7 @@
             <a:fld id="{53BEF823-48A5-43FC-BE03-E79964288B41}" type="datetimeFigureOut">
               <a:rPr lang="en-US" smtClean="0"/>
               <a:pPr algn="r"/>
-              <a:t>3/5/2024</a:t>
+              <a:t>3/6/2024</a:t>
             </a:fld>
             <a:endParaRPr lang="en-US" dirty="0"/>
           </a:p>
@@ -957,7 +963,7 @@
             <a:fld id="{53BEF823-48A5-43FC-BE03-E79964288B41}" type="datetimeFigureOut">
               <a:rPr lang="en-US" smtClean="0"/>
               <a:pPr algn="r"/>
-              <a:t>3/5/2024</a:t>
+              <a:t>3/6/2024</a:t>
             </a:fld>
             <a:endParaRPr lang="en-US" dirty="0"/>
           </a:p>
@@ -1160,7 +1166,7 @@
             <a:fld id="{53BEF823-48A5-43FC-BE03-E79964288B41}" type="datetimeFigureOut">
               <a:rPr lang="en-US" smtClean="0"/>
               <a:pPr algn="r"/>
-              <a:t>3/5/2024</a:t>
+              <a:t>3/6/2024</a:t>
             </a:fld>
             <a:endParaRPr lang="en-US" dirty="0"/>
           </a:p>
@@ -1444,7 +1450,7 @@
             <a:fld id="{53BEF823-48A5-43FC-BE03-E79964288B41}" type="datetimeFigureOut">
               <a:rPr lang="en-US" smtClean="0"/>
               <a:pPr algn="r"/>
-              <a:t>3/5/2024</a:t>
+              <a:t>3/6/2024</a:t>
             </a:fld>
             <a:endParaRPr lang="en-US" dirty="0"/>
           </a:p>
@@ -1688,7 +1694,7 @@
             <a:fld id="{53BEF823-48A5-43FC-BE03-E79964288B41}" type="datetimeFigureOut">
               <a:rPr lang="en-US" smtClean="0"/>
               <a:pPr algn="r"/>
-              <a:t>3/5/2024</a:t>
+              <a:t>3/6/2024</a:t>
             </a:fld>
             <a:endParaRPr lang="en-US" dirty="0"/>
           </a:p>
@@ -2131,7 +2137,7 @@
             <a:fld id="{53BEF823-48A5-43FC-BE03-E79964288B41}" type="datetimeFigureOut">
               <a:rPr lang="en-US" smtClean="0"/>
               <a:pPr algn="r"/>
-              <a:t>3/5/2024</a:t>
+              <a:t>3/6/2024</a:t>
             </a:fld>
             <a:endParaRPr lang="en-US" dirty="0"/>
           </a:p>
@@ -2277,7 +2283,7 @@
             <a:fld id="{53BEF823-48A5-43FC-BE03-E79964288B41}" type="datetimeFigureOut">
               <a:rPr lang="en-US" smtClean="0"/>
               <a:pPr algn="r"/>
-              <a:t>3/5/2024</a:t>
+              <a:t>3/6/2024</a:t>
             </a:fld>
             <a:endParaRPr lang="en-US" dirty="0"/>
           </a:p>
@@ -2395,7 +2401,7 @@
             <a:fld id="{53BEF823-48A5-43FC-BE03-E79964288B41}" type="datetimeFigureOut">
               <a:rPr lang="en-US" smtClean="0"/>
               <a:pPr algn="r"/>
-              <a:t>3/5/2024</a:t>
+              <a:t>3/6/2024</a:t>
             </a:fld>
             <a:endParaRPr lang="en-US" dirty="0"/>
           </a:p>
@@ -2679,7 +2685,7 @@
             <a:fld id="{53BEF823-48A5-43FC-BE03-E79964288B41}" type="datetimeFigureOut">
               <a:rPr lang="en-US" smtClean="0"/>
               <a:pPr algn="r"/>
-              <a:t>3/5/2024</a:t>
+              <a:t>3/6/2024</a:t>
             </a:fld>
             <a:endParaRPr lang="en-US" dirty="0"/>
           </a:p>
@@ -2974,7 +2980,7 @@
             <a:fld id="{53BEF823-48A5-43FC-BE03-E79964288B41}" type="datetimeFigureOut">
               <a:rPr lang="en-US" smtClean="0"/>
               <a:pPr algn="r"/>
-              <a:t>3/5/2024</a:t>
+              <a:t>3/6/2024</a:t>
             </a:fld>
             <a:endParaRPr lang="en-US" dirty="0"/>
           </a:p>
@@ -3469,7 +3475,7 @@
             <a:fld id="{53BEF823-48A5-43FC-BE03-E79964288B41}" type="datetimeFigureOut">
               <a:rPr lang="en-US" smtClean="0"/>
               <a:pPr algn="r"/>
-              <a:t>3/5/2024</a:t>
+              <a:t>3/6/2024</a:t>
             </a:fld>
             <a:endParaRPr lang="en-US" dirty="0"/>
           </a:p>
@@ -6233,8 +6239,8 @@
         </p:blipFill>
         <p:spPr bwMode="auto">
           <a:xfrm>
-            <a:off x="381610" y="1459894"/>
-            <a:ext cx="8671825" cy="5138057"/>
+            <a:off x="1685294" y="1417509"/>
+            <a:ext cx="8520850" cy="5048605"/>
           </a:xfrm>
           <a:prstGeom prst="rect">
             <a:avLst/>
@@ -6588,6 +6594,573 @@
   </p:cSld>
   <p:clrMapOvr>
     <a:overrideClrMapping bg1="dk1" tx1="lt1" bg2="dk2" tx2="lt2" accent1="accent1" accent2="accent2" accent3="accent3" accent4="accent4" accent5="accent5" accent6="accent6" hlink="hlink" folHlink="folHlink"/>
+  </p:clrMapOvr>
+</p:sld>
+</file>
+
+<file path=ppt/slides/slide5.xml><?xml version="1.0" encoding="utf-8"?>
+<p:sld xmlns:a="http://schemas.openxmlformats.org/drawingml/2006/main" xmlns:r="http://schemas.openxmlformats.org/officeDocument/2006/relationships" xmlns:p="http://schemas.openxmlformats.org/presentationml/2006/main">
+  <p:cSld>
+    <p:bg>
+      <p:bgPr>
+        <a:solidFill>
+          <a:schemeClr val="bg2"/>
+        </a:solidFill>
+        <a:effectLst/>
+      </p:bgPr>
+    </p:bg>
+    <p:spTree>
+      <p:nvGrpSpPr>
+        <p:cNvPr id="1" name=""/>
+        <p:cNvGrpSpPr/>
+        <p:nvPr/>
+      </p:nvGrpSpPr>
+      <p:grpSpPr>
+        <a:xfrm>
+          <a:off x="0" y="0"/>
+          <a:ext cx="0" cy="0"/>
+          <a:chOff x="0" y="0"/>
+          <a:chExt cx="0" cy="0"/>
+        </a:xfrm>
+      </p:grpSpPr>
+      <p:sp useBgFill="1">
+        <p:nvSpPr>
+          <p:cNvPr id="21" name="Rectangle 20">
+            <a:extLst>
+              <a:ext uri="{FF2B5EF4-FFF2-40B4-BE49-F238E27FC236}">
+                <a16:creationId xmlns:a16="http://schemas.microsoft.com/office/drawing/2014/main" id="{C5176844-69C3-4F79-BE38-EA5BDDF4FEA4}"/>
+              </a:ext>
+              <a:ext uri="{C183D7F6-B498-43B3-948B-1728B52AA6E4}">
+                <adec:decorative xmlns:adec="http://schemas.microsoft.com/office/drawing/2017/decorative" val="1"/>
+              </a:ext>
+            </a:extLst>
+          </p:cNvPr>
+          <p:cNvSpPr>
+            <a:spLocks noGrp="1" noRot="1" noChangeAspect="1" noMove="1" noResize="1" noEditPoints="1" noAdjustHandles="1" noChangeArrowheads="1" noChangeShapeType="1" noTextEdit="1"/>
+          </p:cNvSpPr>
+          <p:nvPr>
+            <p:extLst>
+              <p:ext uri="{386F3935-93C4-4BCD-93E2-E3B085C9AB24}">
+                <p16:designElem xmlns:p16="http://schemas.microsoft.com/office/powerpoint/2015/main" val="1"/>
+              </p:ext>
+            </p:extLst>
+          </p:nvPr>
+        </p:nvSpPr>
+        <p:spPr>
+          <a:xfrm>
+            <a:off x="0" y="0"/>
+            <a:ext cx="12192000" cy="6858000"/>
+          </a:xfrm>
+          <a:prstGeom prst="rect">
+            <a:avLst/>
+          </a:prstGeom>
+          <a:ln>
+            <a:noFill/>
+          </a:ln>
+        </p:spPr>
+        <p:style>
+          <a:lnRef idx="2">
+            <a:schemeClr val="accent1">
+              <a:shade val="50000"/>
+            </a:schemeClr>
+          </a:lnRef>
+          <a:fillRef idx="1">
+            <a:schemeClr val="accent1"/>
+          </a:fillRef>
+          <a:effectRef idx="0">
+            <a:schemeClr val="accent1"/>
+          </a:effectRef>
+          <a:fontRef idx="minor">
+            <a:schemeClr val="lt1"/>
+          </a:fontRef>
+        </p:style>
+        <p:txBody>
+          <a:bodyPr rtlCol="0" anchor="ctr"/>
+          <a:lstStyle/>
+          <a:p>
+            <a:pPr algn="ctr"/>
+            <a:endParaRPr lang="en-US"/>
+          </a:p>
+        </p:txBody>
+      </p:sp>
+      <p:sp>
+        <p:nvSpPr>
+          <p:cNvPr id="22" name="Rectangle 21">
+            <a:extLst>
+              <a:ext uri="{FF2B5EF4-FFF2-40B4-BE49-F238E27FC236}">
+                <a16:creationId xmlns:a16="http://schemas.microsoft.com/office/drawing/2014/main" id="{41113FF5-9B84-4A89-BF52-EA3C7E01AA3B}"/>
+              </a:ext>
+              <a:ext uri="{C183D7F6-B498-43B3-948B-1728B52AA6E4}">
+                <adec:decorative xmlns:adec="http://schemas.microsoft.com/office/drawing/2017/decorative" val="1"/>
+              </a:ext>
+            </a:extLst>
+          </p:cNvPr>
+          <p:cNvSpPr>
+            <a:spLocks noGrp="1" noRot="1" noChangeAspect="1" noMove="1" noResize="1" noEditPoints="1" noAdjustHandles="1" noChangeArrowheads="1" noChangeShapeType="1" noTextEdit="1"/>
+          </p:cNvSpPr>
+          <p:nvPr>
+            <p:extLst>
+              <p:ext uri="{386F3935-93C4-4BCD-93E2-E3B085C9AB24}">
+                <p16:designElem xmlns:p16="http://schemas.microsoft.com/office/powerpoint/2015/main" val="1"/>
+              </p:ext>
+            </p:extLst>
+          </p:nvPr>
+        </p:nvSpPr>
+        <p:spPr>
+          <a:xfrm>
+            <a:off x="0" y="1"/>
+            <a:ext cx="12191999" cy="1955968"/>
+          </a:xfrm>
+          <a:prstGeom prst="rect">
+            <a:avLst/>
+          </a:prstGeom>
+          <a:solidFill>
+            <a:schemeClr val="tx1">
+              <a:lumMod val="85000"/>
+              <a:lumOff val="15000"/>
+            </a:schemeClr>
+          </a:solidFill>
+          <a:ln>
+            <a:noFill/>
+          </a:ln>
+        </p:spPr>
+        <p:style>
+          <a:lnRef idx="2">
+            <a:schemeClr val="accent1">
+              <a:shade val="50000"/>
+            </a:schemeClr>
+          </a:lnRef>
+          <a:fillRef idx="1">
+            <a:schemeClr val="accent1"/>
+          </a:fillRef>
+          <a:effectRef idx="0">
+            <a:schemeClr val="accent1"/>
+          </a:effectRef>
+          <a:fontRef idx="minor">
+            <a:schemeClr val="lt1"/>
+          </a:fontRef>
+        </p:style>
+        <p:txBody>
+          <a:bodyPr rtlCol="0" anchor="ctr"/>
+          <a:lstStyle/>
+          <a:p>
+            <a:pPr algn="ctr"/>
+            <a:endParaRPr lang="en-US"/>
+          </a:p>
+        </p:txBody>
+      </p:sp>
+      <p:sp>
+        <p:nvSpPr>
+          <p:cNvPr id="2" name="Title 1">
+            <a:extLst>
+              <a:ext uri="{FF2B5EF4-FFF2-40B4-BE49-F238E27FC236}">
+                <a16:creationId xmlns:a16="http://schemas.microsoft.com/office/drawing/2014/main" id="{6BD96970-5C64-32C3-86F3-BF3D6735BEE6}"/>
+              </a:ext>
+            </a:extLst>
+          </p:cNvPr>
+          <p:cNvSpPr>
+            <a:spLocks noGrp="1"/>
+          </p:cNvSpPr>
+          <p:nvPr>
+            <p:ph type="title"/>
+          </p:nvPr>
+        </p:nvSpPr>
+        <p:spPr>
+          <a:xfrm>
+            <a:off x="758952" y="420625"/>
+            <a:ext cx="10667998" cy="1326814"/>
+          </a:xfrm>
+        </p:spPr>
+        <p:txBody>
+          <a:bodyPr anchor="ctr">
+            <a:normAutofit/>
+          </a:bodyPr>
+          <a:lstStyle/>
+          <a:p>
+            <a:r>
+              <a:rPr lang="en-US" dirty="0" err="1">
+                <a:solidFill>
+                  <a:schemeClr val="bg1"/>
+                </a:solidFill>
+              </a:rPr>
+              <a:t>Installatieplan</a:t>
+            </a:r>
+            <a:endParaRPr lang="nl-BE" dirty="0">
+              <a:solidFill>
+                <a:schemeClr val="bg1"/>
+              </a:solidFill>
+            </a:endParaRPr>
+          </a:p>
+        </p:txBody>
+      </p:sp>
+      <p:sp>
+        <p:nvSpPr>
+          <p:cNvPr id="8" name="Content Placeholder 7">
+            <a:extLst>
+              <a:ext uri="{FF2B5EF4-FFF2-40B4-BE49-F238E27FC236}">
+                <a16:creationId xmlns:a16="http://schemas.microsoft.com/office/drawing/2014/main" id="{7AEDEABF-FA17-7E78-1EAE-CB4B7451B99C}"/>
+              </a:ext>
+            </a:extLst>
+          </p:cNvPr>
+          <p:cNvSpPr>
+            <a:spLocks noGrp="1"/>
+          </p:cNvSpPr>
+          <p:nvPr>
+            <p:ph idx="1"/>
+          </p:nvPr>
+        </p:nvSpPr>
+        <p:spPr>
+          <a:xfrm>
+            <a:off x="758952" y="2413169"/>
+            <a:ext cx="6039340" cy="3368920"/>
+          </a:xfrm>
+        </p:spPr>
+        <p:txBody>
+          <a:bodyPr anchor="ctr">
+            <a:normAutofit lnSpcReduction="10000"/>
+          </a:bodyPr>
+          <a:lstStyle/>
+          <a:p>
+            <a:pPr marL="0" indent="0">
+              <a:buNone/>
+            </a:pPr>
+            <a:r>
+              <a:rPr lang="en-US" u="sng" dirty="0" err="1"/>
+              <a:t>Inhoud</a:t>
+            </a:r>
+            <a:endParaRPr lang="en-US" u="sng" dirty="0"/>
+          </a:p>
+          <a:p>
+            <a:pPr marL="0" indent="0">
+              <a:buNone/>
+            </a:pPr>
+            <a:endParaRPr lang="en-US" u="sng" dirty="0"/>
+          </a:p>
+          <a:p>
+            <a:pPr marL="0" indent="0">
+              <a:buNone/>
+            </a:pPr>
+            <a:r>
+              <a:rPr lang="en-US" dirty="0"/>
+              <a:t>- 2 servers</a:t>
+            </a:r>
+          </a:p>
+          <a:p>
+            <a:pPr lvl="1"/>
+            <a:r>
+              <a:rPr lang="en-US" dirty="0"/>
+              <a:t>PowerEdge R860 server </a:t>
+            </a:r>
+          </a:p>
+          <a:p>
+            <a:pPr lvl="1"/>
+            <a:r>
+              <a:rPr lang="en-US" dirty="0"/>
+              <a:t>PowerEdge R750xsz </a:t>
+            </a:r>
+          </a:p>
+          <a:p>
+            <a:pPr marL="0" indent="0">
+              <a:buNone/>
+            </a:pPr>
+            <a:r>
+              <a:rPr lang="en-US" dirty="0"/>
+              <a:t>- 2 Cisco1931 routers</a:t>
+            </a:r>
+          </a:p>
+          <a:p>
+            <a:pPr marL="0" indent="0">
+              <a:buNone/>
+            </a:pPr>
+            <a:r>
+              <a:rPr lang="en-US" dirty="0"/>
+              <a:t>- 4 Cisco WS-C2960S switches met 48 </a:t>
+            </a:r>
+            <a:r>
+              <a:rPr lang="en-US" dirty="0" err="1"/>
+              <a:t>poorten</a:t>
+            </a:r>
+            <a:endParaRPr lang="en-US" dirty="0"/>
+          </a:p>
+          <a:p>
+            <a:pPr marL="0" indent="0">
+              <a:buNone/>
+            </a:pPr>
+            <a:r>
+              <a:rPr lang="en-US" dirty="0"/>
+              <a:t>- 2 Meraki switches</a:t>
+            </a:r>
+          </a:p>
+        </p:txBody>
+      </p:sp>
+      <p:pic>
+        <p:nvPicPr>
+          <p:cNvPr id="4" name="Content Placeholder 3" descr="A close-up of a phone&#10;&#10;Description automatically generated">
+            <a:extLst>
+              <a:ext uri="{FF2B5EF4-FFF2-40B4-BE49-F238E27FC236}">
+                <a16:creationId xmlns:a16="http://schemas.microsoft.com/office/drawing/2014/main" id="{774C176D-4238-8FD4-F591-C9DF4ACB3BBF}"/>
+              </a:ext>
+            </a:extLst>
+          </p:cNvPr>
+          <p:cNvPicPr>
+            <a:picLocks noChangeAspect="1"/>
+          </p:cNvPicPr>
+          <p:nvPr/>
+        </p:nvPicPr>
+        <p:blipFill rotWithShape="1">
+          <a:blip r:embed="rId2">
+            <a:extLst>
+              <a:ext uri="{28A0092B-C50C-407E-A947-70E740481C1C}">
+                <a14:useLocalDpi xmlns:a14="http://schemas.microsoft.com/office/drawing/2010/main" val="0"/>
+              </a:ext>
+            </a:extLst>
+          </a:blip>
+          <a:srcRect r="1489" b="60040"/>
+          <a:stretch/>
+        </p:blipFill>
+        <p:spPr>
+          <a:xfrm>
+            <a:off x="7907657" y="2066713"/>
+            <a:ext cx="3519293" cy="4680542"/>
+          </a:xfrm>
+          <a:prstGeom prst="rect">
+            <a:avLst/>
+          </a:prstGeom>
+        </p:spPr>
+      </p:pic>
+      <p:sp>
+        <p:nvSpPr>
+          <p:cNvPr id="23" name="Freeform 6">
+            <a:extLst>
+              <a:ext uri="{FF2B5EF4-FFF2-40B4-BE49-F238E27FC236}">
+                <a16:creationId xmlns:a16="http://schemas.microsoft.com/office/drawing/2014/main" id="{A101E513-AF74-4E9D-A31F-99664250722D}"/>
+              </a:ext>
+              <a:ext uri="{C183D7F6-B498-43B3-948B-1728B52AA6E4}">
+                <adec:decorative xmlns:adec="http://schemas.microsoft.com/office/drawing/2017/decorative" val="1"/>
+              </a:ext>
+            </a:extLst>
+          </p:cNvPr>
+          <p:cNvSpPr>
+            <a:spLocks noGrp="1" noRot="1" noChangeAspect="1" noMove="1" noResize="1" noEditPoints="1" noAdjustHandles="1" noChangeArrowheads="1" noChangeShapeType="1" noTextEdit="1"/>
+          </p:cNvSpPr>
+          <p:nvPr>
+            <p:extLst>
+              <p:ext uri="{386F3935-93C4-4BCD-93E2-E3B085C9AB24}">
+                <p16:designElem xmlns:p16="http://schemas.microsoft.com/office/powerpoint/2015/main" val="1"/>
+              </p:ext>
+            </p:extLst>
+          </p:nvPr>
+        </p:nvSpPr>
+        <p:spPr bwMode="auto">
+          <a:xfrm>
+            <a:off x="11784011" y="5783564"/>
+            <a:ext cx="407988" cy="819150"/>
+          </a:xfrm>
+          <a:custGeom>
+            <a:avLst/>
+            <a:gdLst/>
+            <a:ahLst/>
+            <a:cxnLst/>
+            <a:rect l="0" t="0" r="r" b="b"/>
+            <a:pathLst>
+              <a:path w="1799" h="3612">
+                <a:moveTo>
+                  <a:pt x="1799" y="0"/>
+                </a:moveTo>
+                <a:lnTo>
+                  <a:pt x="1799" y="3612"/>
+                </a:lnTo>
+                <a:lnTo>
+                  <a:pt x="1686" y="3609"/>
+                </a:lnTo>
+                <a:lnTo>
+                  <a:pt x="1574" y="3598"/>
+                </a:lnTo>
+                <a:lnTo>
+                  <a:pt x="1464" y="3581"/>
+                </a:lnTo>
+                <a:lnTo>
+                  <a:pt x="1357" y="3557"/>
+                </a:lnTo>
+                <a:lnTo>
+                  <a:pt x="1251" y="3527"/>
+                </a:lnTo>
+                <a:lnTo>
+                  <a:pt x="1150" y="3490"/>
+                </a:lnTo>
+                <a:lnTo>
+                  <a:pt x="1050" y="3448"/>
+                </a:lnTo>
+                <a:lnTo>
+                  <a:pt x="953" y="3401"/>
+                </a:lnTo>
+                <a:lnTo>
+                  <a:pt x="860" y="3347"/>
+                </a:lnTo>
+                <a:lnTo>
+                  <a:pt x="771" y="3289"/>
+                </a:lnTo>
+                <a:lnTo>
+                  <a:pt x="686" y="3224"/>
+                </a:lnTo>
+                <a:lnTo>
+                  <a:pt x="604" y="3156"/>
+                </a:lnTo>
+                <a:lnTo>
+                  <a:pt x="527" y="3083"/>
+                </a:lnTo>
+                <a:lnTo>
+                  <a:pt x="454" y="3005"/>
+                </a:lnTo>
+                <a:lnTo>
+                  <a:pt x="386" y="2923"/>
+                </a:lnTo>
+                <a:lnTo>
+                  <a:pt x="323" y="2838"/>
+                </a:lnTo>
+                <a:lnTo>
+                  <a:pt x="265" y="2748"/>
+                </a:lnTo>
+                <a:lnTo>
+                  <a:pt x="211" y="2655"/>
+                </a:lnTo>
+                <a:lnTo>
+                  <a:pt x="163" y="2559"/>
+                </a:lnTo>
+                <a:lnTo>
+                  <a:pt x="121" y="2459"/>
+                </a:lnTo>
+                <a:lnTo>
+                  <a:pt x="85" y="2356"/>
+                </a:lnTo>
+                <a:lnTo>
+                  <a:pt x="55" y="2251"/>
+                </a:lnTo>
+                <a:lnTo>
+                  <a:pt x="32" y="2143"/>
+                </a:lnTo>
+                <a:lnTo>
+                  <a:pt x="14" y="2033"/>
+                </a:lnTo>
+                <a:lnTo>
+                  <a:pt x="4" y="1920"/>
+                </a:lnTo>
+                <a:lnTo>
+                  <a:pt x="0" y="1806"/>
+                </a:lnTo>
+                <a:lnTo>
+                  <a:pt x="4" y="1692"/>
+                </a:lnTo>
+                <a:lnTo>
+                  <a:pt x="14" y="1580"/>
+                </a:lnTo>
+                <a:lnTo>
+                  <a:pt x="32" y="1469"/>
+                </a:lnTo>
+                <a:lnTo>
+                  <a:pt x="55" y="1362"/>
+                </a:lnTo>
+                <a:lnTo>
+                  <a:pt x="85" y="1256"/>
+                </a:lnTo>
+                <a:lnTo>
+                  <a:pt x="121" y="1154"/>
+                </a:lnTo>
+                <a:lnTo>
+                  <a:pt x="163" y="1054"/>
+                </a:lnTo>
+                <a:lnTo>
+                  <a:pt x="211" y="958"/>
+                </a:lnTo>
+                <a:lnTo>
+                  <a:pt x="265" y="864"/>
+                </a:lnTo>
+                <a:lnTo>
+                  <a:pt x="323" y="774"/>
+                </a:lnTo>
+                <a:lnTo>
+                  <a:pt x="386" y="689"/>
+                </a:lnTo>
+                <a:lnTo>
+                  <a:pt x="454" y="607"/>
+                </a:lnTo>
+                <a:lnTo>
+                  <a:pt x="527" y="529"/>
+                </a:lnTo>
+                <a:lnTo>
+                  <a:pt x="604" y="456"/>
+                </a:lnTo>
+                <a:lnTo>
+                  <a:pt x="686" y="388"/>
+                </a:lnTo>
+                <a:lnTo>
+                  <a:pt x="771" y="325"/>
+                </a:lnTo>
+                <a:lnTo>
+                  <a:pt x="860" y="266"/>
+                </a:lnTo>
+                <a:lnTo>
+                  <a:pt x="953" y="212"/>
+                </a:lnTo>
+                <a:lnTo>
+                  <a:pt x="1050" y="164"/>
+                </a:lnTo>
+                <a:lnTo>
+                  <a:pt x="1150" y="122"/>
+                </a:lnTo>
+                <a:lnTo>
+                  <a:pt x="1251" y="85"/>
+                </a:lnTo>
+                <a:lnTo>
+                  <a:pt x="1357" y="55"/>
+                </a:lnTo>
+                <a:lnTo>
+                  <a:pt x="1464" y="32"/>
+                </a:lnTo>
+                <a:lnTo>
+                  <a:pt x="1574" y="14"/>
+                </a:lnTo>
+                <a:lnTo>
+                  <a:pt x="1686" y="5"/>
+                </a:lnTo>
+                <a:lnTo>
+                  <a:pt x="1799" y="0"/>
+                </a:lnTo>
+                <a:close/>
+              </a:path>
+            </a:pathLst>
+          </a:custGeom>
+          <a:solidFill>
+            <a:schemeClr val="tx1">
+              <a:lumMod val="85000"/>
+              <a:lumOff val="15000"/>
+            </a:schemeClr>
+          </a:solidFill>
+          <a:ln w="0">
+            <a:noFill/>
+            <a:prstDash val="solid"/>
+            <a:round/>
+            <a:headEnd/>
+            <a:tailEnd/>
+          </a:ln>
+        </p:spPr>
+        <p:txBody>
+          <a:bodyPr anchor="ctr"/>
+          <a:lstStyle/>
+          <a:p>
+            <a:endParaRPr lang="en-US"/>
+          </a:p>
+        </p:txBody>
+      </p:sp>
+    </p:spTree>
+    <p:extLst>
+      <p:ext uri="{BB962C8B-B14F-4D97-AF65-F5344CB8AC3E}">
+        <p14:creationId xmlns:p14="http://schemas.microsoft.com/office/powerpoint/2010/main" val="3089610942"/>
+      </p:ext>
+    </p:extLst>
+  </p:cSld>
+  <p:clrMapOvr>
+    <a:masterClrMapping/>
   </p:clrMapOvr>
 </p:sld>
 </file>

</xml_diff>

<commit_message>
SEP2324G06-39 Offerte map opgekuist
</commit_message>
<xml_diff>
--- a/opdrachten/Offerte/Presentatie.pptx
+++ b/opdrachten/Offerte/Presentatie.pptx
@@ -537,7 +537,7 @@
           <a:p>
             <a:fld id="{53BEF823-48A5-43FC-BE03-E79964288B41}" type="datetimeFigureOut">
               <a:rPr lang="en-US" smtClean="0"/>
-              <a:t>3/6/2024</a:t>
+              <a:t>4/26/2024</a:t>
             </a:fld>
             <a:endParaRPr lang="en-US" dirty="0"/>
           </a:p>
@@ -748,7 +748,7 @@
             <a:fld id="{53BEF823-48A5-43FC-BE03-E79964288B41}" type="datetimeFigureOut">
               <a:rPr lang="en-US" smtClean="0"/>
               <a:pPr algn="r"/>
-              <a:t>3/6/2024</a:t>
+              <a:t>4/26/2024</a:t>
             </a:fld>
             <a:endParaRPr lang="en-US" dirty="0"/>
           </a:p>
@@ -963,7 +963,7 @@
             <a:fld id="{53BEF823-48A5-43FC-BE03-E79964288B41}" type="datetimeFigureOut">
               <a:rPr lang="en-US" smtClean="0"/>
               <a:pPr algn="r"/>
-              <a:t>3/6/2024</a:t>
+              <a:t>4/26/2024</a:t>
             </a:fld>
             <a:endParaRPr lang="en-US" dirty="0"/>
           </a:p>
@@ -1166,7 +1166,7 @@
             <a:fld id="{53BEF823-48A5-43FC-BE03-E79964288B41}" type="datetimeFigureOut">
               <a:rPr lang="en-US" smtClean="0"/>
               <a:pPr algn="r"/>
-              <a:t>3/6/2024</a:t>
+              <a:t>4/26/2024</a:t>
             </a:fld>
             <a:endParaRPr lang="en-US" dirty="0"/>
           </a:p>
@@ -1450,7 +1450,7 @@
             <a:fld id="{53BEF823-48A5-43FC-BE03-E79964288B41}" type="datetimeFigureOut">
               <a:rPr lang="en-US" smtClean="0"/>
               <a:pPr algn="r"/>
-              <a:t>3/6/2024</a:t>
+              <a:t>4/26/2024</a:t>
             </a:fld>
             <a:endParaRPr lang="en-US" dirty="0"/>
           </a:p>
@@ -1694,7 +1694,7 @@
             <a:fld id="{53BEF823-48A5-43FC-BE03-E79964288B41}" type="datetimeFigureOut">
               <a:rPr lang="en-US" smtClean="0"/>
               <a:pPr algn="r"/>
-              <a:t>3/6/2024</a:t>
+              <a:t>4/26/2024</a:t>
             </a:fld>
             <a:endParaRPr lang="en-US" dirty="0"/>
           </a:p>
@@ -2137,7 +2137,7 @@
             <a:fld id="{53BEF823-48A5-43FC-BE03-E79964288B41}" type="datetimeFigureOut">
               <a:rPr lang="en-US" smtClean="0"/>
               <a:pPr algn="r"/>
-              <a:t>3/6/2024</a:t>
+              <a:t>4/26/2024</a:t>
             </a:fld>
             <a:endParaRPr lang="en-US" dirty="0"/>
           </a:p>
@@ -2283,7 +2283,7 @@
             <a:fld id="{53BEF823-48A5-43FC-BE03-E79964288B41}" type="datetimeFigureOut">
               <a:rPr lang="en-US" smtClean="0"/>
               <a:pPr algn="r"/>
-              <a:t>3/6/2024</a:t>
+              <a:t>4/26/2024</a:t>
             </a:fld>
             <a:endParaRPr lang="en-US" dirty="0"/>
           </a:p>
@@ -2401,7 +2401,7 @@
             <a:fld id="{53BEF823-48A5-43FC-BE03-E79964288B41}" type="datetimeFigureOut">
               <a:rPr lang="en-US" smtClean="0"/>
               <a:pPr algn="r"/>
-              <a:t>3/6/2024</a:t>
+              <a:t>4/26/2024</a:t>
             </a:fld>
             <a:endParaRPr lang="en-US" dirty="0"/>
           </a:p>
@@ -2685,7 +2685,7 @@
             <a:fld id="{53BEF823-48A5-43FC-BE03-E79964288B41}" type="datetimeFigureOut">
               <a:rPr lang="en-US" smtClean="0"/>
               <a:pPr algn="r"/>
-              <a:t>3/6/2024</a:t>
+              <a:t>4/26/2024</a:t>
             </a:fld>
             <a:endParaRPr lang="en-US" dirty="0"/>
           </a:p>
@@ -2980,7 +2980,7 @@
             <a:fld id="{53BEF823-48A5-43FC-BE03-E79964288B41}" type="datetimeFigureOut">
               <a:rPr lang="en-US" smtClean="0"/>
               <a:pPr algn="r"/>
-              <a:t>3/6/2024</a:t>
+              <a:t>4/26/2024</a:t>
             </a:fld>
             <a:endParaRPr lang="en-US" dirty="0"/>
           </a:p>
@@ -3475,7 +3475,7 @@
             <a:fld id="{53BEF823-48A5-43FC-BE03-E79964288B41}" type="datetimeFigureOut">
               <a:rPr lang="en-US" smtClean="0"/>
               <a:pPr algn="r"/>
-              <a:t>3/6/2024</a:t>
+              <a:t>4/26/2024</a:t>
             </a:fld>
             <a:endParaRPr lang="en-US" dirty="0"/>
           </a:p>
@@ -6893,41 +6893,6 @@
           </a:p>
         </p:txBody>
       </p:sp>
-      <p:pic>
-        <p:nvPicPr>
-          <p:cNvPr id="4" name="Content Placeholder 3" descr="A close-up of a phone&#10;&#10;Description automatically generated">
-            <a:extLst>
-              <a:ext uri="{FF2B5EF4-FFF2-40B4-BE49-F238E27FC236}">
-                <a16:creationId xmlns:a16="http://schemas.microsoft.com/office/drawing/2014/main" id="{774C176D-4238-8FD4-F591-C9DF4ACB3BBF}"/>
-              </a:ext>
-            </a:extLst>
-          </p:cNvPr>
-          <p:cNvPicPr>
-            <a:picLocks noChangeAspect="1"/>
-          </p:cNvPicPr>
-          <p:nvPr/>
-        </p:nvPicPr>
-        <p:blipFill rotWithShape="1">
-          <a:blip r:embed="rId2">
-            <a:extLst>
-              <a:ext uri="{28A0092B-C50C-407E-A947-70E740481C1C}">
-                <a14:useLocalDpi xmlns:a14="http://schemas.microsoft.com/office/drawing/2010/main" val="0"/>
-              </a:ext>
-            </a:extLst>
-          </a:blip>
-          <a:srcRect r="1489" b="60040"/>
-          <a:stretch/>
-        </p:blipFill>
-        <p:spPr>
-          <a:xfrm>
-            <a:off x="7907657" y="2066713"/>
-            <a:ext cx="3519293" cy="4680542"/>
-          </a:xfrm>
-          <a:prstGeom prst="rect">
-            <a:avLst/>
-          </a:prstGeom>
-        </p:spPr>
-      </p:pic>
       <p:sp>
         <p:nvSpPr>
           <p:cNvPr id="23" name="Freeform 6">
@@ -7152,6 +7117,41 @@
           </a:p>
         </p:txBody>
       </p:sp>
+      <p:pic>
+        <p:nvPicPr>
+          <p:cNvPr id="5" name="Picture 4" descr="A close-up of a computer server&#10;&#10;Description automatically generated">
+            <a:extLst>
+              <a:ext uri="{FF2B5EF4-FFF2-40B4-BE49-F238E27FC236}">
+                <a16:creationId xmlns:a16="http://schemas.microsoft.com/office/drawing/2014/main" id="{E46E56CE-99C8-BA84-4D20-5E9448E399F9}"/>
+              </a:ext>
+            </a:extLst>
+          </p:cNvPr>
+          <p:cNvPicPr>
+            <a:picLocks noChangeAspect="1"/>
+          </p:cNvPicPr>
+          <p:nvPr/>
+        </p:nvPicPr>
+        <p:blipFill rotWithShape="1">
+          <a:blip r:embed="rId2">
+            <a:extLst>
+              <a:ext uri="{28A0092B-C50C-407E-A947-70E740481C1C}">
+                <a14:useLocalDpi xmlns:a14="http://schemas.microsoft.com/office/drawing/2010/main" val="0"/>
+              </a:ext>
+            </a:extLst>
+          </a:blip>
+          <a:srcRect l="5019" t="4073" r="9664"/>
+          <a:stretch/>
+        </p:blipFill>
+        <p:spPr>
+          <a:xfrm>
+            <a:off x="8035624" y="2310672"/>
+            <a:ext cx="3391326" cy="4540038"/>
+          </a:xfrm>
+          <a:prstGeom prst="rect">
+            <a:avLst/>
+          </a:prstGeom>
+        </p:spPr>
+      </p:pic>
     </p:spTree>
     <p:extLst>
       <p:ext uri="{BB962C8B-B14F-4D97-AF65-F5344CB8AC3E}">

</xml_diff>